<commit_message>
update structure for powerpnt
</commit_message>
<xml_diff>
--- a/Presentation/Classification-of-time-signals-by-CNN-using-STFT.pptx
+++ b/Presentation/Classification-of-time-signals-by-CNN-using-STFT.pptx
@@ -276,7 +276,7 @@
           <a:p>
             <a:fld id="{672A33CF-3CD6-4BF6-9652-92EE052783A5}" type="datetimeFigureOut">
               <a:rPr lang="en-US" smtClean="0"/>
-              <a:t>10/7/2021</a:t>
+              <a:t>10/12/2021</a:t>
             </a:fld>
             <a:endParaRPr lang="en-US"/>
           </a:p>
@@ -474,7 +474,7 @@
           <a:p>
             <a:fld id="{672A33CF-3CD6-4BF6-9652-92EE052783A5}" type="datetimeFigureOut">
               <a:rPr lang="en-US" smtClean="0"/>
-              <a:t>10/7/2021</a:t>
+              <a:t>10/12/2021</a:t>
             </a:fld>
             <a:endParaRPr lang="en-US"/>
           </a:p>
@@ -682,7 +682,7 @@
           <a:p>
             <a:fld id="{672A33CF-3CD6-4BF6-9652-92EE052783A5}" type="datetimeFigureOut">
               <a:rPr lang="en-US" smtClean="0"/>
-              <a:t>10/7/2021</a:t>
+              <a:t>10/12/2021</a:t>
             </a:fld>
             <a:endParaRPr lang="en-US"/>
           </a:p>
@@ -880,7 +880,7 @@
           <a:p>
             <a:fld id="{672A33CF-3CD6-4BF6-9652-92EE052783A5}" type="datetimeFigureOut">
               <a:rPr lang="en-US" smtClean="0"/>
-              <a:t>10/7/2021</a:t>
+              <a:t>10/12/2021</a:t>
             </a:fld>
             <a:endParaRPr lang="en-US"/>
           </a:p>
@@ -1155,7 +1155,7 @@
           <a:p>
             <a:fld id="{672A33CF-3CD6-4BF6-9652-92EE052783A5}" type="datetimeFigureOut">
               <a:rPr lang="en-US" smtClean="0"/>
-              <a:t>10/7/2021</a:t>
+              <a:t>10/12/2021</a:t>
             </a:fld>
             <a:endParaRPr lang="en-US"/>
           </a:p>
@@ -1420,7 +1420,7 @@
           <a:p>
             <a:fld id="{672A33CF-3CD6-4BF6-9652-92EE052783A5}" type="datetimeFigureOut">
               <a:rPr lang="en-US" smtClean="0"/>
-              <a:t>10/7/2021</a:t>
+              <a:t>10/12/2021</a:t>
             </a:fld>
             <a:endParaRPr lang="en-US"/>
           </a:p>
@@ -1832,7 +1832,7 @@
           <a:p>
             <a:fld id="{672A33CF-3CD6-4BF6-9652-92EE052783A5}" type="datetimeFigureOut">
               <a:rPr lang="en-US" smtClean="0"/>
-              <a:t>10/7/2021</a:t>
+              <a:t>10/12/2021</a:t>
             </a:fld>
             <a:endParaRPr lang="en-US"/>
           </a:p>
@@ -1973,7 +1973,7 @@
           <a:p>
             <a:fld id="{672A33CF-3CD6-4BF6-9652-92EE052783A5}" type="datetimeFigureOut">
               <a:rPr lang="en-US" smtClean="0"/>
-              <a:t>10/7/2021</a:t>
+              <a:t>10/12/2021</a:t>
             </a:fld>
             <a:endParaRPr lang="en-US"/>
           </a:p>
@@ -2086,7 +2086,7 @@
           <a:p>
             <a:fld id="{672A33CF-3CD6-4BF6-9652-92EE052783A5}" type="datetimeFigureOut">
               <a:rPr lang="en-US" smtClean="0"/>
-              <a:t>10/7/2021</a:t>
+              <a:t>10/12/2021</a:t>
             </a:fld>
             <a:endParaRPr lang="en-US"/>
           </a:p>
@@ -2397,7 +2397,7 @@
           <a:p>
             <a:fld id="{672A33CF-3CD6-4BF6-9652-92EE052783A5}" type="datetimeFigureOut">
               <a:rPr lang="en-US" smtClean="0"/>
-              <a:t>10/7/2021</a:t>
+              <a:t>10/12/2021</a:t>
             </a:fld>
             <a:endParaRPr lang="en-US"/>
           </a:p>
@@ -2685,7 +2685,7 @@
           <a:p>
             <a:fld id="{672A33CF-3CD6-4BF6-9652-92EE052783A5}" type="datetimeFigureOut">
               <a:rPr lang="en-US" smtClean="0"/>
-              <a:t>10/7/2021</a:t>
+              <a:t>10/12/2021</a:t>
             </a:fld>
             <a:endParaRPr lang="en-US"/>
           </a:p>
@@ -2929,7 +2929,7 @@
           <a:p>
             <a:fld id="{672A33CF-3CD6-4BF6-9652-92EE052783A5}" type="datetimeFigureOut">
               <a:rPr lang="en-US" smtClean="0"/>
-              <a:t>10/7/2021</a:t>
+              <a:t>10/12/2021</a:t>
             </a:fld>
             <a:endParaRPr lang="en-US"/>
           </a:p>
@@ -3663,7 +3663,7 @@
               <a:buChar char="•"/>
             </a:pPr>
             <a:r>
-              <a:rPr lang="en-US" sz="2000" dirty="0">
+              <a:rPr lang="en-US" sz="2200" dirty="0">
                 <a:latin typeface="Times New Roman" panose="02020603050405020304" pitchFamily="18" charset="0"/>
                 <a:cs typeface="Times New Roman" panose="02020603050405020304" pitchFamily="18" charset="0"/>
               </a:rPr>
@@ -3685,20 +3685,20 @@
               <a:buChar char="•"/>
             </a:pPr>
             <a:r>
-              <a:rPr lang="en-US" sz="2000" dirty="0">
+              <a:rPr lang="en-US" sz="2200" dirty="0">
                 <a:latin typeface="Times New Roman" panose="02020603050405020304" pitchFamily="18" charset="0"/>
                 <a:cs typeface="Times New Roman" panose="02020603050405020304" pitchFamily="18" charset="0"/>
               </a:rPr>
               <a:t>By		: Prof. Dr. Andreas </a:t>
             </a:r>
             <a:r>
-              <a:rPr lang="en-US" sz="2000" dirty="0" err="1">
+              <a:rPr lang="en-US" sz="2200" dirty="0" err="1">
                 <a:latin typeface="Times New Roman" panose="02020603050405020304" pitchFamily="18" charset="0"/>
                 <a:cs typeface="Times New Roman" panose="02020603050405020304" pitchFamily="18" charset="0"/>
               </a:rPr>
               <a:t>Pech</a:t>
             </a:r>
-            <a:endParaRPr lang="en-US" sz="2000" dirty="0">
+            <a:endParaRPr lang="en-US" sz="2200" dirty="0">
               <a:latin typeface="Times New Roman" panose="02020603050405020304" pitchFamily="18" charset="0"/>
               <a:cs typeface="Times New Roman" panose="02020603050405020304" pitchFamily="18" charset="0"/>
             </a:endParaRPr>
@@ -3718,11 +3718,11 @@
               <a:buChar char="•"/>
             </a:pPr>
             <a:r>
-              <a:rPr lang="en-US" sz="2000" dirty="0">
+              <a:rPr lang="en-US" sz="2200" dirty="0">
                 <a:latin typeface="Times New Roman" panose="02020603050405020304" pitchFamily="18" charset="0"/>
                 <a:cs typeface="Times New Roman" panose="02020603050405020304" pitchFamily="18" charset="0"/>
               </a:rPr>
-              <a:t>Group		: T3</a:t>
+              <a:t>Group	: T3</a:t>
             </a:r>
           </a:p>
           <a:p>
@@ -3740,7 +3740,7 @@
               <a:buChar char="•"/>
             </a:pPr>
             <a:r>
-              <a:rPr lang="en-US" sz="2000" dirty="0">
+              <a:rPr lang="en-US" sz="2200" dirty="0">
                 <a:latin typeface="Times New Roman" panose="02020603050405020304" pitchFamily="18" charset="0"/>
                 <a:cs typeface="Times New Roman" panose="02020603050405020304" pitchFamily="18" charset="0"/>
               </a:rPr>
@@ -3762,7 +3762,7 @@
               <a:buAutoNum type="arabicPeriod"/>
             </a:pPr>
             <a:r>
-              <a:rPr lang="en-US" sz="2000" dirty="0">
+              <a:rPr lang="en-US" sz="2200" dirty="0">
                 <a:latin typeface="Times New Roman" panose="02020603050405020304" pitchFamily="18" charset="0"/>
                 <a:cs typeface="Times New Roman" panose="02020603050405020304" pitchFamily="18" charset="0"/>
               </a:rPr>
@@ -3784,13 +3784,13 @@
               <a:buAutoNum type="arabicPeriod"/>
             </a:pPr>
             <a:r>
-              <a:rPr lang="en-US" sz="2000" dirty="0" err="1">
+              <a:rPr lang="en-US" sz="2200" dirty="0" err="1">
                 <a:latin typeface="Times New Roman" panose="02020603050405020304" pitchFamily="18" charset="0"/>
                 <a:cs typeface="Times New Roman" panose="02020603050405020304" pitchFamily="18" charset="0"/>
               </a:rPr>
               <a:t>Mahdieh</a:t>
             </a:r>
-            <a:endParaRPr lang="en-US" sz="2000" dirty="0">
+            <a:endParaRPr lang="en-US" sz="2200" dirty="0">
               <a:latin typeface="Times New Roman" panose="02020603050405020304" pitchFamily="18" charset="0"/>
               <a:cs typeface="Times New Roman" panose="02020603050405020304" pitchFamily="18" charset="0"/>
             </a:endParaRPr>
@@ -3810,13 +3810,13 @@
               <a:buAutoNum type="arabicPeriod"/>
             </a:pPr>
             <a:r>
-              <a:rPr lang="en-US" sz="2000" dirty="0" err="1">
+              <a:rPr lang="en-US" sz="2200" dirty="0" err="1">
                 <a:latin typeface="Times New Roman" panose="02020603050405020304" pitchFamily="18" charset="0"/>
                 <a:cs typeface="Times New Roman" panose="02020603050405020304" pitchFamily="18" charset="0"/>
               </a:rPr>
               <a:t>Mukit</a:t>
             </a:r>
-            <a:endParaRPr lang="en-US" sz="2000" dirty="0">
+            <a:endParaRPr lang="en-US" sz="2200" dirty="0">
               <a:latin typeface="Times New Roman" panose="02020603050405020304" pitchFamily="18" charset="0"/>
               <a:cs typeface="Times New Roman" panose="02020603050405020304" pitchFamily="18" charset="0"/>
             </a:endParaRPr>
@@ -3836,13 +3836,13 @@
               <a:buAutoNum type="arabicPeriod"/>
             </a:pPr>
             <a:r>
-              <a:rPr lang="en-US" sz="2000" dirty="0" err="1">
+              <a:rPr lang="en-US" sz="2200" dirty="0" err="1">
                 <a:latin typeface="Times New Roman" panose="02020603050405020304" pitchFamily="18" charset="0"/>
                 <a:cs typeface="Times New Roman" panose="02020603050405020304" pitchFamily="18" charset="0"/>
               </a:rPr>
               <a:t>Rabiul</a:t>
             </a:r>
-            <a:endParaRPr lang="en-US" sz="2000" dirty="0">
+            <a:endParaRPr lang="en-US" sz="2200" dirty="0">
               <a:latin typeface="Times New Roman" panose="02020603050405020304" pitchFamily="18" charset="0"/>
               <a:cs typeface="Times New Roman" panose="02020603050405020304" pitchFamily="18" charset="0"/>
             </a:endParaRPr>
@@ -3861,7 +3861,7 @@
               <a:buFont typeface="Arial" panose="020B0604020202020204" pitchFamily="34" charset="0"/>
               <a:buChar char="•"/>
             </a:pPr>
-            <a:endParaRPr lang="en-US" sz="2000" dirty="0">
+            <a:endParaRPr lang="en-US" sz="2200" dirty="0">
               <a:latin typeface="Times New Roman" panose="02020603050405020304" pitchFamily="18" charset="0"/>
               <a:cs typeface="Times New Roman" panose="02020603050405020304" pitchFamily="18" charset="0"/>
             </a:endParaRPr>
@@ -4565,7 +4565,7 @@
               <a:buChar char="•"/>
             </a:pPr>
             <a:r>
-              <a:rPr lang="en-US" sz="2000" dirty="0">
+              <a:rPr lang="en-US" sz="2200" dirty="0">
                 <a:latin typeface="Times New Roman" panose="02020603050405020304" pitchFamily="18" charset="0"/>
                 <a:cs typeface="Times New Roman" panose="02020603050405020304" pitchFamily="18" charset="0"/>
               </a:rPr>
@@ -4587,7 +4587,7 @@
               <a:buChar char="•"/>
             </a:pPr>
             <a:r>
-              <a:rPr lang="en-US" sz="2000" dirty="0">
+              <a:rPr lang="en-US" sz="2200" dirty="0">
                 <a:latin typeface="Times New Roman" panose="02020603050405020304" pitchFamily="18" charset="0"/>
                 <a:cs typeface="Times New Roman" panose="02020603050405020304" pitchFamily="18" charset="0"/>
               </a:rPr>
@@ -4609,7 +4609,7 @@
               <a:buChar char="•"/>
             </a:pPr>
             <a:r>
-              <a:rPr lang="en-US" sz="2000" dirty="0">
+              <a:rPr lang="en-US" sz="2200" dirty="0">
                 <a:latin typeface="Times New Roman" panose="02020603050405020304" pitchFamily="18" charset="0"/>
                 <a:cs typeface="Times New Roman" panose="02020603050405020304" pitchFamily="18" charset="0"/>
               </a:rPr>
@@ -4631,7 +4631,7 @@
               <a:buChar char="•"/>
             </a:pPr>
             <a:r>
-              <a:rPr lang="en-US" sz="2000" dirty="0">
+              <a:rPr lang="en-US" sz="2200" dirty="0">
                 <a:latin typeface="Times New Roman" panose="02020603050405020304" pitchFamily="18" charset="0"/>
                 <a:cs typeface="Times New Roman" panose="02020603050405020304" pitchFamily="18" charset="0"/>
               </a:rPr>
@@ -4653,7 +4653,7 @@
               <a:buChar char="•"/>
             </a:pPr>
             <a:r>
-              <a:rPr lang="en-US" sz="2000" dirty="0">
+              <a:rPr lang="en-US" sz="2200" dirty="0">
                 <a:latin typeface="Times New Roman" panose="02020603050405020304" pitchFamily="18" charset="0"/>
                 <a:cs typeface="Times New Roman" panose="02020603050405020304" pitchFamily="18" charset="0"/>
               </a:rPr>
@@ -4674,7 +4674,7 @@
               <a:buFont typeface="Arial" panose="020B0604020202020204" pitchFamily="34" charset="0"/>
               <a:buChar char="•"/>
             </a:pPr>
-            <a:endParaRPr lang="en-US" sz="2000" dirty="0">
+            <a:endParaRPr lang="en-US" sz="2200" dirty="0">
               <a:latin typeface="Times New Roman" panose="02020603050405020304" pitchFamily="18" charset="0"/>
               <a:cs typeface="Times New Roman" panose="02020603050405020304" pitchFamily="18" charset="0"/>
             </a:endParaRPr>
@@ -5147,6 +5147,75 @@
           </a:p>
         </p:txBody>
       </p:sp>
+      <p:sp>
+        <p:nvSpPr>
+          <p:cNvPr id="10" name="TextBox 9">
+            <a:extLst>
+              <a:ext uri="{FF2B5EF4-FFF2-40B4-BE49-F238E27FC236}">
+                <a16:creationId xmlns:a16="http://schemas.microsoft.com/office/drawing/2014/main" id="{F36285A8-34C8-4B99-8259-BEC07EDA9A72}"/>
+              </a:ext>
+            </a:extLst>
+          </p:cNvPr>
+          <p:cNvSpPr txBox="1"/>
+          <p:nvPr/>
+        </p:nvSpPr>
+        <p:spPr>
+          <a:xfrm>
+            <a:off x="643468" y="1782981"/>
+            <a:ext cx="6842935" cy="4393982"/>
+          </a:xfrm>
+          <a:prstGeom prst="rect">
+            <a:avLst/>
+          </a:prstGeom>
+        </p:spPr>
+        <p:txBody>
+          <a:bodyPr vert="horz" lIns="91440" tIns="45720" rIns="91440" bIns="45720" rtlCol="0">
+            <a:normAutofit/>
+          </a:bodyPr>
+          <a:lstStyle/>
+          <a:p>
+            <a:pPr indent="-228600">
+              <a:lnSpc>
+                <a:spcPct val="90000"/>
+              </a:lnSpc>
+              <a:spcAft>
+                <a:spcPts val="600"/>
+              </a:spcAft>
+              <a:buClr>
+                <a:schemeClr val="accent1"/>
+              </a:buClr>
+              <a:buFont typeface="Arial" panose="020B0604020202020204" pitchFamily="34" charset="0"/>
+              <a:buChar char="•"/>
+            </a:pPr>
+            <a:r>
+              <a:rPr lang="en-US" sz="2200" dirty="0">
+                <a:latin typeface="Times New Roman" panose="02020603050405020304" pitchFamily="18" charset="0"/>
+                <a:cs typeface="Times New Roman" panose="02020603050405020304" pitchFamily="18" charset="0"/>
+              </a:rPr>
+              <a:t>Font : Times New Roman size 22</a:t>
+            </a:r>
+          </a:p>
+          <a:p>
+            <a:pPr indent="-228600">
+              <a:lnSpc>
+                <a:spcPct val="90000"/>
+              </a:lnSpc>
+              <a:spcAft>
+                <a:spcPts val="600"/>
+              </a:spcAft>
+              <a:buClr>
+                <a:schemeClr val="accent1"/>
+              </a:buClr>
+              <a:buFont typeface="Arial" panose="020B0604020202020204" pitchFamily="34" charset="0"/>
+              <a:buChar char="•"/>
+            </a:pPr>
+            <a:endParaRPr lang="en-US" sz="2200" dirty="0">
+              <a:latin typeface="Times New Roman" panose="02020603050405020304" pitchFamily="18" charset="0"/>
+              <a:cs typeface="Times New Roman" panose="02020603050405020304" pitchFamily="18" charset="0"/>
+            </a:endParaRPr>
+          </a:p>
+        </p:txBody>
+      </p:sp>
     </p:spTree>
     <p:extLst>
       <p:ext uri="{BB962C8B-B14F-4D97-AF65-F5344CB8AC3E}">
@@ -5613,6 +5682,75 @@
           </a:p>
         </p:txBody>
       </p:sp>
+      <p:sp>
+        <p:nvSpPr>
+          <p:cNvPr id="10" name="TextBox 9">
+            <a:extLst>
+              <a:ext uri="{FF2B5EF4-FFF2-40B4-BE49-F238E27FC236}">
+                <a16:creationId xmlns:a16="http://schemas.microsoft.com/office/drawing/2014/main" id="{9538337C-82F4-41D2-B2A6-E522340D6913}"/>
+              </a:ext>
+            </a:extLst>
+          </p:cNvPr>
+          <p:cNvSpPr txBox="1"/>
+          <p:nvPr/>
+        </p:nvSpPr>
+        <p:spPr>
+          <a:xfrm>
+            <a:off x="643468" y="1782981"/>
+            <a:ext cx="6842935" cy="4393982"/>
+          </a:xfrm>
+          <a:prstGeom prst="rect">
+            <a:avLst/>
+          </a:prstGeom>
+        </p:spPr>
+        <p:txBody>
+          <a:bodyPr vert="horz" lIns="91440" tIns="45720" rIns="91440" bIns="45720" rtlCol="0">
+            <a:normAutofit/>
+          </a:bodyPr>
+          <a:lstStyle/>
+          <a:p>
+            <a:pPr indent="-228600">
+              <a:lnSpc>
+                <a:spcPct val="90000"/>
+              </a:lnSpc>
+              <a:spcAft>
+                <a:spcPts val="600"/>
+              </a:spcAft>
+              <a:buClr>
+                <a:schemeClr val="accent1"/>
+              </a:buClr>
+              <a:buFont typeface="Arial" panose="020B0604020202020204" pitchFamily="34" charset="0"/>
+              <a:buChar char="•"/>
+            </a:pPr>
+            <a:r>
+              <a:rPr lang="en-US" sz="2200" dirty="0">
+                <a:latin typeface="Times New Roman" panose="02020603050405020304" pitchFamily="18" charset="0"/>
+                <a:cs typeface="Times New Roman" panose="02020603050405020304" pitchFamily="18" charset="0"/>
+              </a:rPr>
+              <a:t>Font : Times New Roman size 22</a:t>
+            </a:r>
+          </a:p>
+          <a:p>
+            <a:pPr indent="-228600">
+              <a:lnSpc>
+                <a:spcPct val="90000"/>
+              </a:lnSpc>
+              <a:spcAft>
+                <a:spcPts val="600"/>
+              </a:spcAft>
+              <a:buClr>
+                <a:schemeClr val="accent1"/>
+              </a:buClr>
+              <a:buFont typeface="Arial" panose="020B0604020202020204" pitchFamily="34" charset="0"/>
+              <a:buChar char="•"/>
+            </a:pPr>
+            <a:endParaRPr lang="en-US" sz="2200" dirty="0">
+              <a:latin typeface="Times New Roman" panose="02020603050405020304" pitchFamily="18" charset="0"/>
+              <a:cs typeface="Times New Roman" panose="02020603050405020304" pitchFamily="18" charset="0"/>
+            </a:endParaRPr>
+          </a:p>
+        </p:txBody>
+      </p:sp>
     </p:spTree>
     <p:extLst>
       <p:ext uri="{BB962C8B-B14F-4D97-AF65-F5344CB8AC3E}">
@@ -6079,6 +6217,75 @@
           </a:p>
         </p:txBody>
       </p:sp>
+      <p:sp>
+        <p:nvSpPr>
+          <p:cNvPr id="10" name="TextBox 9">
+            <a:extLst>
+              <a:ext uri="{FF2B5EF4-FFF2-40B4-BE49-F238E27FC236}">
+                <a16:creationId xmlns:a16="http://schemas.microsoft.com/office/drawing/2014/main" id="{2776F35C-1D05-4A58-82E0-309C7FEFD2A9}"/>
+              </a:ext>
+            </a:extLst>
+          </p:cNvPr>
+          <p:cNvSpPr txBox="1"/>
+          <p:nvPr/>
+        </p:nvSpPr>
+        <p:spPr>
+          <a:xfrm>
+            <a:off x="643468" y="1782981"/>
+            <a:ext cx="6842935" cy="4393982"/>
+          </a:xfrm>
+          <a:prstGeom prst="rect">
+            <a:avLst/>
+          </a:prstGeom>
+        </p:spPr>
+        <p:txBody>
+          <a:bodyPr vert="horz" lIns="91440" tIns="45720" rIns="91440" bIns="45720" rtlCol="0">
+            <a:normAutofit/>
+          </a:bodyPr>
+          <a:lstStyle/>
+          <a:p>
+            <a:pPr indent="-228600">
+              <a:lnSpc>
+                <a:spcPct val="90000"/>
+              </a:lnSpc>
+              <a:spcAft>
+                <a:spcPts val="600"/>
+              </a:spcAft>
+              <a:buClr>
+                <a:schemeClr val="accent1"/>
+              </a:buClr>
+              <a:buFont typeface="Arial" panose="020B0604020202020204" pitchFamily="34" charset="0"/>
+              <a:buChar char="•"/>
+            </a:pPr>
+            <a:r>
+              <a:rPr lang="en-US" sz="2200" dirty="0">
+                <a:latin typeface="Times New Roman" panose="02020603050405020304" pitchFamily="18" charset="0"/>
+                <a:cs typeface="Times New Roman" panose="02020603050405020304" pitchFamily="18" charset="0"/>
+              </a:rPr>
+              <a:t>Font : Times New Roman size 22</a:t>
+            </a:r>
+          </a:p>
+          <a:p>
+            <a:pPr indent="-228600">
+              <a:lnSpc>
+                <a:spcPct val="90000"/>
+              </a:lnSpc>
+              <a:spcAft>
+                <a:spcPts val="600"/>
+              </a:spcAft>
+              <a:buClr>
+                <a:schemeClr val="accent1"/>
+              </a:buClr>
+              <a:buFont typeface="Arial" panose="020B0604020202020204" pitchFamily="34" charset="0"/>
+              <a:buChar char="•"/>
+            </a:pPr>
+            <a:endParaRPr lang="en-US" sz="2200" dirty="0">
+              <a:latin typeface="Times New Roman" panose="02020603050405020304" pitchFamily="18" charset="0"/>
+              <a:cs typeface="Times New Roman" panose="02020603050405020304" pitchFamily="18" charset="0"/>
+            </a:endParaRPr>
+          </a:p>
+        </p:txBody>
+      </p:sp>
     </p:spTree>
     <p:extLst>
       <p:ext uri="{BB962C8B-B14F-4D97-AF65-F5344CB8AC3E}">
@@ -6545,6 +6752,75 @@
           </a:p>
         </p:txBody>
       </p:sp>
+      <p:sp>
+        <p:nvSpPr>
+          <p:cNvPr id="10" name="TextBox 9">
+            <a:extLst>
+              <a:ext uri="{FF2B5EF4-FFF2-40B4-BE49-F238E27FC236}">
+                <a16:creationId xmlns:a16="http://schemas.microsoft.com/office/drawing/2014/main" id="{F03E5F94-69C6-49A4-B533-68928E883BD4}"/>
+              </a:ext>
+            </a:extLst>
+          </p:cNvPr>
+          <p:cNvSpPr txBox="1"/>
+          <p:nvPr/>
+        </p:nvSpPr>
+        <p:spPr>
+          <a:xfrm>
+            <a:off x="643468" y="1782981"/>
+            <a:ext cx="6842935" cy="4393982"/>
+          </a:xfrm>
+          <a:prstGeom prst="rect">
+            <a:avLst/>
+          </a:prstGeom>
+        </p:spPr>
+        <p:txBody>
+          <a:bodyPr vert="horz" lIns="91440" tIns="45720" rIns="91440" bIns="45720" rtlCol="0">
+            <a:normAutofit/>
+          </a:bodyPr>
+          <a:lstStyle/>
+          <a:p>
+            <a:pPr indent="-228600">
+              <a:lnSpc>
+                <a:spcPct val="90000"/>
+              </a:lnSpc>
+              <a:spcAft>
+                <a:spcPts val="600"/>
+              </a:spcAft>
+              <a:buClr>
+                <a:schemeClr val="accent1"/>
+              </a:buClr>
+              <a:buFont typeface="Arial" panose="020B0604020202020204" pitchFamily="34" charset="0"/>
+              <a:buChar char="•"/>
+            </a:pPr>
+            <a:r>
+              <a:rPr lang="en-US" sz="2200" dirty="0">
+                <a:latin typeface="Times New Roman" panose="02020603050405020304" pitchFamily="18" charset="0"/>
+                <a:cs typeface="Times New Roman" panose="02020603050405020304" pitchFamily="18" charset="0"/>
+              </a:rPr>
+              <a:t>Font : Times New Roman size 22</a:t>
+            </a:r>
+          </a:p>
+          <a:p>
+            <a:pPr indent="-228600">
+              <a:lnSpc>
+                <a:spcPct val="90000"/>
+              </a:lnSpc>
+              <a:spcAft>
+                <a:spcPts val="600"/>
+              </a:spcAft>
+              <a:buClr>
+                <a:schemeClr val="accent1"/>
+              </a:buClr>
+              <a:buFont typeface="Arial" panose="020B0604020202020204" pitchFamily="34" charset="0"/>
+              <a:buChar char="•"/>
+            </a:pPr>
+            <a:endParaRPr lang="en-US" sz="2200" dirty="0">
+              <a:latin typeface="Times New Roman" panose="02020603050405020304" pitchFamily="18" charset="0"/>
+              <a:cs typeface="Times New Roman" panose="02020603050405020304" pitchFamily="18" charset="0"/>
+            </a:endParaRPr>
+          </a:p>
+        </p:txBody>
+      </p:sp>
     </p:spTree>
     <p:extLst>
       <p:ext uri="{BB962C8B-B14F-4D97-AF65-F5344CB8AC3E}">
@@ -7008,6 +7284,75 @@
               </a:rPr>
               <a:t>Conclusion</a:t>
             </a:r>
+          </a:p>
+        </p:txBody>
+      </p:sp>
+      <p:sp>
+        <p:nvSpPr>
+          <p:cNvPr id="10" name="TextBox 9">
+            <a:extLst>
+              <a:ext uri="{FF2B5EF4-FFF2-40B4-BE49-F238E27FC236}">
+                <a16:creationId xmlns:a16="http://schemas.microsoft.com/office/drawing/2014/main" id="{3E2366B4-DA4C-41BE-83B1-CFB5B8ABECD9}"/>
+              </a:ext>
+            </a:extLst>
+          </p:cNvPr>
+          <p:cNvSpPr txBox="1"/>
+          <p:nvPr/>
+        </p:nvSpPr>
+        <p:spPr>
+          <a:xfrm>
+            <a:off x="643468" y="1782981"/>
+            <a:ext cx="6842935" cy="4393982"/>
+          </a:xfrm>
+          <a:prstGeom prst="rect">
+            <a:avLst/>
+          </a:prstGeom>
+        </p:spPr>
+        <p:txBody>
+          <a:bodyPr vert="horz" lIns="91440" tIns="45720" rIns="91440" bIns="45720" rtlCol="0">
+            <a:normAutofit/>
+          </a:bodyPr>
+          <a:lstStyle/>
+          <a:p>
+            <a:pPr indent="-228600">
+              <a:lnSpc>
+                <a:spcPct val="90000"/>
+              </a:lnSpc>
+              <a:spcAft>
+                <a:spcPts val="600"/>
+              </a:spcAft>
+              <a:buClr>
+                <a:schemeClr val="accent1"/>
+              </a:buClr>
+              <a:buFont typeface="Arial" panose="020B0604020202020204" pitchFamily="34" charset="0"/>
+              <a:buChar char="•"/>
+            </a:pPr>
+            <a:r>
+              <a:rPr lang="en-US" sz="2200" dirty="0">
+                <a:latin typeface="Times New Roman" panose="02020603050405020304" pitchFamily="18" charset="0"/>
+                <a:cs typeface="Times New Roman" panose="02020603050405020304" pitchFamily="18" charset="0"/>
+              </a:rPr>
+              <a:t>Font : Times New Roman size 22</a:t>
+            </a:r>
+          </a:p>
+          <a:p>
+            <a:pPr indent="-228600">
+              <a:lnSpc>
+                <a:spcPct val="90000"/>
+              </a:lnSpc>
+              <a:spcAft>
+                <a:spcPts val="600"/>
+              </a:spcAft>
+              <a:buClr>
+                <a:schemeClr val="accent1"/>
+              </a:buClr>
+              <a:buFont typeface="Arial" panose="020B0604020202020204" pitchFamily="34" charset="0"/>
+              <a:buChar char="•"/>
+            </a:pPr>
+            <a:endParaRPr lang="en-US" sz="2200" dirty="0">
+              <a:latin typeface="Times New Roman" panose="02020603050405020304" pitchFamily="18" charset="0"/>
+              <a:cs typeface="Times New Roman" panose="02020603050405020304" pitchFamily="18" charset="0"/>
+            </a:endParaRPr>
           </a:p>
         </p:txBody>
       </p:sp>

</xml_diff>